<commit_message>
Couples Hot Stone Massage
</commit_message>
<xml_diff>
--- a/Couples Hot Stone Massage.pptx
+++ b/Couples Hot Stone Massage.pptx
@@ -413,7 +413,7 @@
           <a:p>
             <a:fld id="{5FC71576-86C6-4469-8702-0929E53BF5ED}" type="datetimeFigureOut">
               <a:rPr lang="en-US" smtClean="0"/>
-              <a:t>6/23/2021</a:t>
+              <a:t>6/30/2021</a:t>
             </a:fld>
             <a:endParaRPr lang="en-US"/>
           </a:p>
@@ -806,7 +806,7 @@
           <a:p>
             <a:fld id="{5FC71576-86C6-4469-8702-0929E53BF5ED}" type="datetimeFigureOut">
               <a:rPr lang="en-US" smtClean="0"/>
-              <a:t>6/23/2021</a:t>
+              <a:t>6/30/2021</a:t>
             </a:fld>
             <a:endParaRPr lang="en-US"/>
           </a:p>
@@ -1338,7 +1338,7 @@
           <a:p>
             <a:fld id="{5FC71576-86C6-4469-8702-0929E53BF5ED}" type="datetimeFigureOut">
               <a:rPr lang="en-US" smtClean="0"/>
-              <a:t>6/23/2021</a:t>
+              <a:t>6/30/2021</a:t>
             </a:fld>
             <a:endParaRPr lang="en-US"/>
           </a:p>
@@ -1471,7 +1471,7 @@
           <a:p>
             <a:fld id="{5FC71576-86C6-4469-8702-0929E53BF5ED}" type="datetimeFigureOut">
               <a:rPr lang="en-US" smtClean="0"/>
-              <a:t>6/23/2021</a:t>
+              <a:t>6/30/2021</a:t>
             </a:fld>
             <a:endParaRPr lang="en-US"/>
           </a:p>
@@ -2014,7 +2014,7 @@
           <a:p>
             <a:fld id="{5FC71576-86C6-4469-8702-0929E53BF5ED}" type="datetimeFigureOut">
               <a:rPr lang="en-US" smtClean="0"/>
-              <a:t>6/23/2021</a:t>
+              <a:t>6/30/2021</a:t>
             </a:fld>
             <a:endParaRPr lang="en-US"/>
           </a:p>
@@ -2309,7 +2309,7 @@
           <a:p>
             <a:fld id="{5FC71576-86C6-4469-8702-0929E53BF5ED}" type="datetimeFigureOut">
               <a:rPr lang="en-US" smtClean="0"/>
-              <a:t>6/23/2021</a:t>
+              <a:t>6/30/2021</a:t>
             </a:fld>
             <a:endParaRPr lang="en-US"/>
           </a:p>
@@ -2968,7 +2968,7 @@
           <a:p>
             <a:fld id="{5FC71576-86C6-4469-8702-0929E53BF5ED}" type="datetimeFigureOut">
               <a:rPr lang="en-US" smtClean="0"/>
-              <a:t>6/23/2021</a:t>
+              <a:t>6/30/2021</a:t>
             </a:fld>
             <a:endParaRPr lang="en-US"/>
           </a:p>
@@ -3404,7 +3404,7 @@
           <a:p>
             <a:fld id="{5FC71576-86C6-4469-8702-0929E53BF5ED}" type="datetimeFigureOut">
               <a:rPr lang="en-US" smtClean="0"/>
-              <a:t>6/23/2021</a:t>
+              <a:t>6/30/2021</a:t>
             </a:fld>
             <a:endParaRPr lang="en-US"/>
           </a:p>
@@ -3717,7 +3717,7 @@
           <a:p>
             <a:fld id="{5FC71576-86C6-4469-8702-0929E53BF5ED}" type="datetimeFigureOut">
               <a:rPr lang="en-US" smtClean="0"/>
-              <a:t>6/23/2021</a:t>
+              <a:t>6/30/2021</a:t>
             </a:fld>
             <a:endParaRPr lang="en-US"/>
           </a:p>
@@ -4449,7 +4449,7 @@
           <a:p>
             <a:fld id="{5FC71576-86C6-4469-8702-0929E53BF5ED}" type="datetimeFigureOut">
               <a:rPr lang="en-US" smtClean="0"/>
-              <a:t>6/23/2021</a:t>
+              <a:t>6/30/2021</a:t>
             </a:fld>
             <a:endParaRPr lang="en-US"/>
           </a:p>
@@ -5113,7 +5113,7 @@
           <a:p>
             <a:fld id="{5FC71576-86C6-4469-8702-0929E53BF5ED}" type="datetimeFigureOut">
               <a:rPr lang="en-US" smtClean="0"/>
-              <a:t>6/23/2021</a:t>
+              <a:t>6/30/2021</a:t>
             </a:fld>
             <a:endParaRPr lang="en-US"/>
           </a:p>
@@ -5386,7 +5386,7 @@
           <a:p>
             <a:fld id="{5FC71576-86C6-4469-8702-0929E53BF5ED}" type="datetimeFigureOut">
               <a:rPr lang="en-US" smtClean="0"/>
-              <a:t>6/23/2021</a:t>
+              <a:t>6/30/2021</a:t>
             </a:fld>
             <a:endParaRPr lang="en-US"/>
           </a:p>
@@ -6071,8 +6071,8 @@
         </p:nvSpPr>
         <p:spPr>
           <a:xfrm>
-            <a:off x="685800" y="533400"/>
-            <a:ext cx="7772400" cy="914400"/>
+            <a:off x="304800" y="685800"/>
+            <a:ext cx="8610600" cy="1447800"/>
           </a:xfrm>
         </p:spPr>
         <p:txBody>
@@ -6082,10 +6082,10 @@
           <a:lstStyle/>
           <a:p>
             <a:r>
-              <a:rPr lang="en-US" sz="3200" b="1" dirty="0"/>
-              <a:t>Couples Hot Stone Massage.</a:t>
-            </a:r>
-            <a:endParaRPr lang="en-US" sz="3200" b="1" dirty="0"/>
+              <a:rPr lang="en-US" b="1" dirty="0"/>
+              <a:t>What is Hot Stone Massage, and how long does it take?</a:t>
+            </a:r>
+            <a:endParaRPr lang="en-US" dirty="0"/>
           </a:p>
         </p:txBody>
       </p:sp>
@@ -6111,8 +6111,8 @@
         </p:blipFill>
         <p:spPr>
           <a:xfrm>
-            <a:off x="152400" y="2438400"/>
-            <a:ext cx="8839200" cy="4267200"/>
+            <a:off x="152400" y="2514600"/>
+            <a:ext cx="8839200" cy="4191000"/>
           </a:xfrm>
           <a:prstGeom prst="rect">
             <a:avLst/>
@@ -6159,25 +6159,18 @@
             <p:ph type="title"/>
           </p:nvPr>
         </p:nvSpPr>
-        <p:spPr>
-          <a:xfrm>
-            <a:off x="308679" y="228600"/>
-            <a:ext cx="8534400" cy="987552"/>
-          </a:xfrm>
-        </p:spPr>
-        <p:txBody>
-          <a:bodyPr>
-            <a:normAutofit fontScale="90000"/>
-          </a:bodyPr>
-          <a:lstStyle/>
-          <a:p>
-            <a:r>
-              <a:rPr lang="en-US" sz="3600" b="1" dirty="0">
+        <p:spPr/>
+        <p:txBody>
+          <a:bodyPr/>
+          <a:lstStyle/>
+          <a:p>
+            <a:r>
+              <a:rPr lang="en-US" b="1" dirty="0">
                 <a:solidFill>
                   <a:schemeClr val="accent1"/>
                 </a:solidFill>
               </a:rPr>
-              <a:t>Experience the Relaxation of Hot Stone Therapy for Yourself</a:t>
+              <a:t>Benefits of couples hot stone massage</a:t>
             </a:r>
             <a:endParaRPr lang="en-US" dirty="0"/>
           </a:p>
@@ -6197,30 +6190,31 @@
         <p:txBody>
           <a:bodyPr/>
           <a:lstStyle/>
+          <a:p>
+            <a:pPr lvl="0"/>
+            <a:r>
+              <a:rPr lang="en-US" b="1" dirty="0"/>
+              <a:t>Offer someone you love for the healing of massage</a:t>
+            </a:r>
+            <a:endParaRPr lang="en-US" dirty="0"/>
+          </a:p>
           <a:p>
             <a:pPr marL="0" indent="0">
               <a:buNone/>
             </a:pPr>
             <a:r>
-              <a:rPr lang="en-US" dirty="0"/>
-              <a:t>Read our suggestions on what you need to do after massages to ensure that you enjoy the full advantages of your Couples Hot Stone Massage session. It will assist your body heal and let you experience the benefits</a:t>
-            </a:r>
-            <a:r>
-              <a:rPr lang="en-US" dirty="0" smtClean="0"/>
-              <a:t>!</a:t>
-            </a:r>
-          </a:p>
-          <a:p>
-            <a:pPr marL="0" indent="0">
-              <a:buNone/>
-            </a:pPr>
+              <a:rPr lang="en-US" sz="2300" dirty="0"/>
+              <a:t>A couple's hot stone massage will be a perfect way to expose them to the wellness benefits if you meet someone with chronic pain or health issues depressed and desperate. It could just be what they need to begin the journey towards a better life.</a:t>
+            </a:r>
+          </a:p>
+          <a:p>
             <a:endParaRPr lang="en-US" dirty="0"/>
           </a:p>
         </p:txBody>
       </p:sp>
       <p:pic>
         <p:nvPicPr>
-          <p:cNvPr id="4" name="Picture 3"/>
+          <p:cNvPr id="5" name="Picture 4"/>
           <p:cNvPicPr>
             <a:picLocks noChangeAspect="1"/>
           </p:cNvPicPr>
@@ -6240,8 +6234,8 @@
         </p:blipFill>
         <p:spPr>
           <a:xfrm>
-            <a:off x="152400" y="3733800"/>
-            <a:ext cx="8839200" cy="2971799"/>
+            <a:off x="152400" y="4038600"/>
+            <a:ext cx="8839200" cy="2695125"/>
           </a:xfrm>
           <a:prstGeom prst="rect">
             <a:avLst/>
@@ -6251,7 +6245,7 @@
     </p:spTree>
     <p:extLst>
       <p:ext uri="{BB962C8B-B14F-4D97-AF65-F5344CB8AC3E}">
-        <p14:creationId xmlns:p14="http://schemas.microsoft.com/office/powerpoint/2010/main" val="1319815991"/>
+        <p14:creationId xmlns:p14="http://schemas.microsoft.com/office/powerpoint/2010/main" val="3701990072"/>
       </p:ext>
     </p:extLst>
   </p:cSld>
@@ -6301,44 +6295,51 @@
           <a:lstStyle/>
           <a:p>
             <a:r>
-              <a:rPr lang="en-US" b="0" dirty="0"/>
-              <a:t>Our licensed massage therapist employs the most refined oils and soft, heated stones to alleviate pain and stress. Massage therapists use moderate pressure on the body in addition to placing crystals to increase client performance. Specific laws and legislation concerning the clean-up of a site we are ready to respect</a:t>
-            </a:r>
-            <a:r>
-              <a:rPr lang="en-US" b="0" dirty="0" smtClean="0"/>
+              <a:rPr lang="en-US" dirty="0"/>
+              <a:t>Our approved massage therapist uses the best oils and soft, warm stones on the body to relieve pain and tension. In addition to putting crystals, massage therapists apply mild pressure to the body to improve customer performance. There are specific rules and legislation relating to the clean-up of a site that we are prepared to comply with</a:t>
+            </a:r>
+            <a:r>
+              <a:rPr lang="en-US" dirty="0" smtClean="0"/>
               <a:t>.</a:t>
             </a:r>
           </a:p>
           <a:p>
-            <a:r>
-              <a:rPr lang="en-US" b="0" dirty="0">
+            <a:endParaRPr lang="en-US" dirty="0"/>
+          </a:p>
+          <a:p>
+            <a:r>
+              <a:rPr lang="en-US" dirty="0" smtClean="0"/>
+              <a:t>Please </a:t>
+            </a:r>
+            <a:r>
+              <a:rPr lang="en-US" dirty="0"/>
+              <a:t>Visit Website </a:t>
+            </a:r>
+            <a:endParaRPr lang="en-US" dirty="0" smtClean="0"/>
+          </a:p>
+          <a:p>
+            <a:r>
+              <a:rPr lang="en-US" dirty="0" smtClean="0">
                 <a:hlinkClick r:id="rId2"/>
               </a:rPr>
-              <a:t> </a:t>
+              <a:t>https</a:t>
             </a:r>
             <a:r>
               <a:rPr lang="en-US" dirty="0">
                 <a:hlinkClick r:id="rId2"/>
               </a:rPr>
-              <a:t>Please </a:t>
+              <a:t>://</a:t>
             </a:r>
             <a:r>
               <a:rPr lang="en-US" dirty="0" smtClean="0">
                 <a:hlinkClick r:id="rId2"/>
               </a:rPr>
-              <a:t>Visit Website</a:t>
-            </a:r>
-            <a:r>
-              <a:rPr lang="en-US" dirty="0">
-                <a:hlinkClick r:id="rId2"/>
-              </a:rPr>
-              <a:t>.</a:t>
-            </a:r>
-            <a:endParaRPr lang="en-US" u="sng" dirty="0">
-              <a:solidFill>
-                <a:schemeClr val="tx1"/>
-              </a:solidFill>
-            </a:endParaRPr>
+              <a:t>eastpearlmassage.com/</a:t>
+            </a:r>
+            <a:endParaRPr lang="en-US" dirty="0"/>
+          </a:p>
+          <a:p>
+            <a:endParaRPr lang="en-US" b="0" dirty="0"/>
           </a:p>
         </p:txBody>
       </p:sp>
@@ -6424,8 +6425,8 @@
         </p:nvSpPr>
         <p:spPr>
           <a:xfrm>
-            <a:off x="301752" y="688848"/>
-            <a:ext cx="8534400" cy="758952"/>
+            <a:off x="301752" y="381000"/>
+            <a:ext cx="8534400" cy="685800"/>
           </a:xfrm>
         </p:spPr>
         <p:txBody>
@@ -6435,36 +6436,18 @@
           <a:lstStyle/>
           <a:p>
             <a:r>
-              <a:rPr lang="en-US" b="1" dirty="0">
+              <a:rPr lang="en-US" sz="3200" b="1" dirty="0">
                 <a:solidFill>
                   <a:schemeClr val="accent1"/>
                 </a:solidFill>
               </a:rPr>
-              <a:t>History of Hot Stone Therapy</a:t>
-            </a:r>
-            <a:r>
-              <a:rPr lang="en-US" dirty="0">
-                <a:solidFill>
-                  <a:schemeClr val="accent1"/>
-                </a:solidFill>
-              </a:rPr>
-              <a:t/>
-            </a:r>
-            <a:br>
-              <a:rPr lang="en-US" dirty="0">
-                <a:solidFill>
-                  <a:schemeClr val="accent1"/>
-                </a:solidFill>
-              </a:rPr>
-            </a:br>
-            <a:r>
-              <a:rPr lang="en-US" sz="2000" dirty="0"/>
-              <a:t/>
-            </a:r>
-            <a:br>
-              <a:rPr lang="en-US" sz="2000" dirty="0"/>
-            </a:br>
-            <a:endParaRPr lang="en-US" sz="2000" dirty="0"/>
+              <a:t>Hot Stone Massage</a:t>
+            </a:r>
+            <a:endParaRPr lang="en-US" sz="2900" dirty="0">
+              <a:solidFill>
+                <a:schemeClr val="accent1"/>
+              </a:solidFill>
+            </a:endParaRPr>
           </a:p>
         </p:txBody>
       </p:sp>
@@ -6480,8 +6463,8 @@
         </p:nvSpPr>
         <p:spPr>
           <a:xfrm>
-            <a:off x="301752" y="1524000"/>
-            <a:ext cx="8503920" cy="4800600"/>
+            <a:off x="301752" y="1420091"/>
+            <a:ext cx="8689848" cy="5209309"/>
           </a:xfrm>
         </p:spPr>
         <p:txBody>
@@ -6490,48 +6473,63 @@
           </a:bodyPr>
           <a:lstStyle/>
           <a:p>
+            <a:r>
+              <a:rPr lang="en-US" sz="2500" dirty="0" smtClean="0"/>
+              <a:t>Hot Stones </a:t>
+            </a:r>
+            <a:r>
+              <a:rPr lang="en-US" sz="2500" dirty="0"/>
+              <a:t>Massage</a:t>
+            </a:r>
+            <a:r>
+              <a:rPr lang="en-US" sz="2500" dirty="0" smtClean="0"/>
+              <a:t> </a:t>
+            </a:r>
+            <a:r>
+              <a:rPr lang="en-US" sz="2500" dirty="0"/>
+              <a:t>is a form of therapy for smooth and warm rocks. The massage doctor holds the hot pills at some parts of the body and can even retain the massage stones.</a:t>
+            </a:r>
+          </a:p>
+          <a:p>
+            <a:r>
+              <a:rPr lang="en-US" sz="2500" dirty="0" smtClean="0"/>
+              <a:t>The </a:t>
+            </a:r>
+            <a:r>
+              <a:rPr lang="en-US" sz="2500" b="1" dirty="0" smtClean="0">
+                <a:hlinkClick r:id="rId2"/>
+              </a:rPr>
+              <a:t>hot stones massage </a:t>
+            </a:r>
+            <a:r>
+              <a:rPr lang="en-US" sz="2500" dirty="0" smtClean="0"/>
+              <a:t>warm </a:t>
+            </a:r>
+            <a:r>
+              <a:rPr lang="en-US" sz="2500" dirty="0"/>
+              <a:t>up and relieve their concentrated heat and weight, which means that the massage therapist can pressure certain places without causing any pain.</a:t>
+            </a:r>
+          </a:p>
+          <a:p>
+            <a:r>
+              <a:rPr lang="en-US" sz="2500" dirty="0"/>
+              <a:t>And 60 to 90 minutes are necessary.</a:t>
+            </a:r>
+          </a:p>
+          <a:p>
             <a:pPr marL="0" indent="0">
               <a:buNone/>
             </a:pPr>
             <a:r>
-              <a:rPr lang="en-US" sz="2600" dirty="0"/>
-              <a:t>Hot Stone Massages are among the various massage therapies utilized by ancient Chinese physicians and are among the oldest known treatments. Using heat stones to ease the pain was also reported among Native Americans, Europeans, and ancient Egyptians. The single therapy approach reappeared in the early 1990s following the discovery of its use by the American massage therapist Mary Nelson and its reintroduction into the massage and spa sector. Today at spas worldwide,</a:t>
-            </a:r>
-            <a:r>
-              <a:rPr lang="en-US" sz="2600" dirty="0">
-                <a:hlinkClick r:id="rId2"/>
-              </a:rPr>
-              <a:t> </a:t>
-            </a:r>
-            <a:r>
-              <a:rPr lang="en-US" sz="2600" b="1" dirty="0">
-                <a:hlinkClick r:id="rId2"/>
-              </a:rPr>
-              <a:t>Couples Hot Stone Massage</a:t>
-            </a:r>
-            <a:r>
-              <a:rPr lang="en-US" sz="2600" dirty="0">
-                <a:hlinkClick r:id="rId2"/>
-              </a:rPr>
-              <a:t> </a:t>
-            </a:r>
-            <a:r>
-              <a:rPr lang="en-US" sz="2600" dirty="0"/>
-              <a:t>are widespread. There are even pure thermal baths in which many people have healing and relaxation.</a:t>
+              <a:rPr lang="en-US" sz="2400" dirty="0"/>
+              <a:t>The therapist uses Swedish back, knees, neck, and shoulders massage techniques while the stones are in place or extracted. The length is 60 and 90 minutes for a standard heat stone massage.</a:t>
             </a:r>
           </a:p>
           <a:p>
             <a:pPr marL="0" indent="0">
               <a:buNone/>
             </a:pPr>
-            <a:r>
-              <a:rPr lang="en-US" sz="2000" dirty="0"/>
-              <a:t/>
-            </a:r>
-            <a:br>
-              <a:rPr lang="en-US" sz="2000" dirty="0"/>
-            </a:br>
-            <a:endParaRPr lang="en-US" sz="2000" dirty="0"/>
+            <a:endParaRPr lang="en-US" sz="2400" dirty="0"/>
           </a:p>
         </p:txBody>
       </p:sp>
@@ -6577,8 +6575,8 @@
         </p:nvSpPr>
         <p:spPr>
           <a:xfrm>
-            <a:off x="228600" y="27709"/>
-            <a:ext cx="8534400" cy="1295400"/>
+            <a:off x="228600" y="339436"/>
+            <a:ext cx="8783782" cy="1170709"/>
           </a:xfrm>
         </p:spPr>
         <p:txBody>
@@ -6593,9 +6591,24 @@
                   <a:schemeClr val="accent1"/>
                 </a:solidFill>
               </a:rPr>
-              <a:t>What to Expect During a Couples Hot Stone Massage</a:t>
-            </a:r>
-            <a:endParaRPr lang="en-US" sz="2400" dirty="0">
+              <a:t>Basics of couples Hot Stone Massage</a:t>
+            </a:r>
+            <a:r>
+              <a:rPr lang="en-US" dirty="0">
+                <a:solidFill>
+                  <a:schemeClr val="accent1"/>
+                </a:solidFill>
+              </a:rPr>
+              <a:t/>
+            </a:r>
+            <a:br>
+              <a:rPr lang="en-US" dirty="0">
+                <a:solidFill>
+                  <a:schemeClr val="accent1"/>
+                </a:solidFill>
+              </a:rPr>
+            </a:br>
+            <a:endParaRPr lang="en-US" sz="2900" b="1" dirty="0">
               <a:solidFill>
                 <a:schemeClr val="accent1"/>
               </a:solidFill>
@@ -6615,8 +6628,8 @@
         </p:nvSpPr>
         <p:spPr>
           <a:xfrm>
-            <a:off x="381000" y="1524000"/>
-            <a:ext cx="8503920" cy="5181600"/>
+            <a:off x="228600" y="1524000"/>
+            <a:ext cx="8656320" cy="5181600"/>
           </a:xfrm>
         </p:spPr>
         <p:txBody>
@@ -6629,12 +6642,8 @@
               <a:buNone/>
             </a:pPr>
             <a:r>
-              <a:rPr lang="en-US" dirty="0"/>
-              <a:t>A 90-minute thermal massage might make you intimidating, but you don't have to worry about it. Hot stones massage is a safe method developed only for your body to be relaxed and healed</a:t>
-            </a:r>
-            <a:r>
-              <a:rPr lang="en-US" dirty="0" smtClean="0"/>
-              <a:t>.</a:t>
+              <a:rPr lang="en-US" sz="2600" dirty="0"/>
+              <a:t>The application of warm stones characterizes the hot stone massage. Usually, Basalt river rocks are used because they are flat (from the river) and keep the heat well.</a:t>
             </a:r>
           </a:p>
           <a:p>
@@ -6642,16 +6651,32 @@
               <a:buNone/>
             </a:pPr>
             <a:r>
-              <a:rPr lang="en-US" sz="2650" dirty="0" smtClean="0"/>
-              <a:t>At </a:t>
-            </a:r>
-            <a:r>
-              <a:rPr lang="en-US" sz="2650" dirty="0"/>
-              <a:t>the beginning of the session, the therapist might put the hot stones on your body. You are invited to lie down. The rocks are seldom put on the skin directly. Most therapists instead put a cloth between yourself and the stones to serve as a heat buffer. You should tell your therapist immediately if you feel pain, just as with any other massage.</a:t>
-            </a:r>
-          </a:p>
-          <a:p>
-            <a:endParaRPr lang="en-US" sz="1800" dirty="0"/>
+              <a:rPr lang="en-US" sz="2600" dirty="0"/>
+              <a:t>The massage therapist is ready to heat the stones in a licensed stone therapist until they are usually between 110 and 130 F in a specific temperature range. Never use hot plates and slow cookers to avoid fires, microwaves, stoves</a:t>
+            </a:r>
+            <a:r>
+              <a:rPr lang="en-US" sz="2600" dirty="0" smtClean="0"/>
+              <a:t>.</a:t>
+            </a:r>
+          </a:p>
+          <a:p>
+            <a:pPr marL="0" indent="0">
+              <a:buNone/>
+            </a:pPr>
+            <a:r>
+              <a:rPr lang="en-US" sz="2500" dirty="0" smtClean="0"/>
+              <a:t>Although </a:t>
+            </a:r>
+            <a:r>
+              <a:rPr lang="en-US" sz="2500" dirty="0"/>
+              <a:t>massage therapists frequently use anatomy to direct stone positioning, some therapists may often put stones on points designed to align mind and mind energetically.</a:t>
+            </a:r>
+          </a:p>
+          <a:p>
+            <a:pPr marL="0" lvl="0" indent="0">
+              <a:buNone/>
+            </a:pPr>
+            <a:endParaRPr lang="en-US" sz="2300" dirty="0"/>
           </a:p>
         </p:txBody>
       </p:sp>
@@ -6697,8 +6722,8 @@
         </p:nvSpPr>
         <p:spPr>
           <a:xfrm>
-            <a:off x="228600" y="-304800"/>
-            <a:ext cx="8534400" cy="1371600"/>
+            <a:off x="350520" y="304800"/>
+            <a:ext cx="8534400" cy="1295400"/>
           </a:xfrm>
         </p:spPr>
         <p:txBody>
@@ -6713,9 +6738,24 @@
                   <a:schemeClr val="accent1"/>
                 </a:solidFill>
               </a:rPr>
-              <a:t>Couples Hot Stone Massage</a:t>
-            </a:r>
-            <a:endParaRPr lang="en-US" sz="2000" dirty="0">
+              <a:t>What happens during a couple's hot stone massage?</a:t>
+            </a:r>
+            <a:r>
+              <a:rPr lang="en-US" dirty="0">
+                <a:solidFill>
+                  <a:schemeClr val="accent1"/>
+                </a:solidFill>
+              </a:rPr>
+              <a:t/>
+            </a:r>
+            <a:br>
+              <a:rPr lang="en-US" dirty="0">
+                <a:solidFill>
+                  <a:schemeClr val="accent1"/>
+                </a:solidFill>
+              </a:rPr>
+            </a:br>
+            <a:endParaRPr lang="en-US" sz="2900" dirty="0">
               <a:solidFill>
                 <a:schemeClr val="accent1"/>
               </a:solidFill>
@@ -6735,8 +6775,8 @@
         </p:nvSpPr>
         <p:spPr>
           <a:xfrm>
-            <a:off x="381000" y="1524000"/>
-            <a:ext cx="8503920" cy="4724400"/>
+            <a:off x="228600" y="1447800"/>
+            <a:ext cx="8656320" cy="5029200"/>
           </a:xfrm>
         </p:spPr>
         <p:txBody>
@@ -6749,10 +6789,45 @@
               <a:buNone/>
             </a:pPr>
             <a:r>
-              <a:rPr lang="en-US" sz="3200" dirty="0"/>
-              <a:t>When the stones calm down and calm your muscles, your therapist utilizes Swedish massage or tissue methods to massage your body further. These might include motions like lengthy strokes or circular motifs. Your therapist can do this with his hands or by the use of the hot stone. You may also use massage oil to ease stress further and alleviate tension and knots.</a:t>
-            </a:r>
-            <a:endParaRPr lang="en-US" sz="3200" dirty="0"/>
+              <a:rPr lang="en-US" dirty="0"/>
+              <a:t>A massage with hot stones is a form of massage. It is used in the body to help you calm and relieve sore muscles and weakened soft tissue.</a:t>
+            </a:r>
+          </a:p>
+          <a:p>
+            <a:pPr marL="0" indent="0">
+              <a:buNone/>
+            </a:pPr>
+            <a:r>
+              <a:rPr lang="en-US" dirty="0"/>
+              <a:t>Smooth, complex, warm stones are placed on some areas of the body during a couple's hot stone; massage generally consists of basalt, a kind of heat-keeping volcanic rock. Heated between 130 and 145 degrees, hot massage stones must be placed: Stones may be:</a:t>
+            </a:r>
+          </a:p>
+          <a:p>
+            <a:pPr lvl="0"/>
+            <a:r>
+              <a:rPr lang="en-US" dirty="0"/>
+              <a:t>Along your spine</a:t>
+            </a:r>
+          </a:p>
+          <a:p>
+            <a:pPr lvl="0"/>
+            <a:r>
+              <a:rPr lang="en-US" dirty="0"/>
+              <a:t>On your stomach</a:t>
+            </a:r>
+          </a:p>
+          <a:p>
+            <a:pPr lvl="0"/>
+            <a:r>
+              <a:rPr lang="en-US" dirty="0"/>
+              <a:t>On your chest</a:t>
+            </a:r>
+          </a:p>
+          <a:p>
+            <a:pPr marL="0" indent="0">
+              <a:buNone/>
+            </a:pPr>
+            <a:endParaRPr lang="en-US" dirty="0"/>
           </a:p>
         </p:txBody>
       </p:sp>
@@ -6798,7 +6873,7 @@
         </p:nvSpPr>
         <p:spPr>
           <a:xfrm>
-            <a:off x="272935" y="-228600"/>
+            <a:off x="304800" y="-152400"/>
             <a:ext cx="8534400" cy="1143000"/>
           </a:xfrm>
         </p:spPr>
@@ -6809,14 +6884,14 @@
           <a:lstStyle/>
           <a:p>
             <a:r>
-              <a:rPr lang="en-US" sz="3200" b="1" dirty="0">
+              <a:rPr lang="en-US" sz="2800" b="1" dirty="0" smtClean="0">
                 <a:solidFill>
                   <a:schemeClr val="accent1"/>
                 </a:solidFill>
               </a:rPr>
-              <a:t>Benefits of Couples Hot Stone Massage</a:t>
-            </a:r>
-            <a:endParaRPr lang="en-US" sz="3200" dirty="0">
+              <a:t>Couple's Hot Stone Massage.</a:t>
+            </a:r>
+            <a:endParaRPr lang="en-US" sz="2600" dirty="0">
               <a:solidFill>
                 <a:schemeClr val="accent1"/>
               </a:solidFill>
@@ -6836,8 +6911,8 @@
         </p:nvSpPr>
         <p:spPr>
           <a:xfrm>
-            <a:off x="259080" y="1371600"/>
-            <a:ext cx="8503920" cy="5105400"/>
+            <a:off x="152400" y="1295400"/>
+            <a:ext cx="8839200" cy="5105400"/>
           </a:xfrm>
         </p:spPr>
         <p:txBody>
@@ -6846,49 +6921,89 @@
           </a:bodyPr>
           <a:lstStyle/>
           <a:p>
+            <a:pPr lvl="0"/>
+            <a:r>
+              <a:rPr lang="en-US" sz="2300" dirty="0"/>
+              <a:t>On your face</a:t>
+            </a:r>
+          </a:p>
+          <a:p>
+            <a:pPr lvl="0"/>
+            <a:r>
+              <a:rPr lang="en-US" sz="2300" dirty="0" smtClean="0"/>
+              <a:t>On your feet and toes</a:t>
+            </a:r>
+          </a:p>
+          <a:p>
+            <a:pPr lvl="0"/>
+            <a:r>
+              <a:rPr lang="en-US" sz="2300" dirty="0" smtClean="0"/>
+              <a:t>On </a:t>
+            </a:r>
+            <a:r>
+              <a:rPr lang="en-US" sz="2300" dirty="0"/>
+              <a:t>your palms</a:t>
+            </a:r>
+          </a:p>
+          <a:p>
             <a:pPr marL="0" indent="0">
               <a:buNone/>
             </a:pPr>
             <a:r>
-              <a:rPr lang="en-US" dirty="0"/>
-              <a:t>A Couples Hot Stone Massage still on the fence? These thermal massages will persuade you to try it</a:t>
-            </a:r>
-            <a:r>
-              <a:rPr lang="en-US" dirty="0" smtClean="0"/>
-              <a:t>!</a:t>
+              <a:rPr lang="en-US" sz="2300" dirty="0" smtClean="0"/>
+              <a:t>Heating </a:t>
+            </a:r>
+            <a:r>
+              <a:rPr lang="en-US" sz="2300" dirty="0"/>
+              <a:t>stones should be held by massage practitioners when using Swedish methods of massaging the body like:</a:t>
+            </a:r>
+          </a:p>
+          <a:p>
+            <a:pPr lvl="0"/>
+            <a:r>
+              <a:rPr lang="en-US" sz="2300" dirty="0"/>
+              <a:t>Long strokes</a:t>
+            </a:r>
+          </a:p>
+          <a:p>
+            <a:pPr lvl="0"/>
+            <a:r>
+              <a:rPr lang="en-US" sz="2300" dirty="0"/>
+              <a:t>Circular movements</a:t>
+            </a:r>
+          </a:p>
+          <a:p>
+            <a:pPr lvl="0"/>
+            <a:r>
+              <a:rPr lang="en-US" sz="2300" dirty="0"/>
+              <a:t>Vibration</a:t>
+            </a:r>
+          </a:p>
+          <a:p>
+            <a:pPr lvl="0"/>
+            <a:r>
+              <a:rPr lang="en-US" sz="2300" dirty="0"/>
+              <a:t>Tapping</a:t>
+            </a:r>
+          </a:p>
+          <a:p>
+            <a:pPr lvl="0"/>
+            <a:r>
+              <a:rPr lang="en-US" sz="2300" dirty="0"/>
+              <a:t>Kneading</a:t>
             </a:r>
           </a:p>
           <a:p>
             <a:pPr marL="0" indent="0">
               <a:buNone/>
             </a:pPr>
-            <a:endParaRPr lang="en-US" dirty="0" smtClean="0"/>
-          </a:p>
-          <a:p>
-            <a:r>
-              <a:rPr lang="en-US" b="1" dirty="0" smtClean="0"/>
-              <a:t>Eases </a:t>
-            </a:r>
-            <a:r>
-              <a:rPr lang="en-US" b="1" dirty="0"/>
-              <a:t>Muscle Pain and Reduces Tension</a:t>
-            </a:r>
-            <a:endParaRPr lang="en-US" dirty="0"/>
-          </a:p>
-          <a:p>
-            <a:pPr marL="0" indent="0">
-              <a:buNone/>
-            </a:pPr>
-            <a:r>
-              <a:rPr lang="en-US" dirty="0"/>
-              <a:t>The heat provided by hot stones can alleviate tight muscles. The stiffness you experience throughout your body can be substantially decreased by relaxing your muscles and decreasing edema and infection. Warmth may also promote cure, enhance joint flexibility and quickly make your body feel nimble.</a:t>
-            </a:r>
-          </a:p>
-          <a:p>
-            <a:pPr marL="0" indent="0">
-              <a:buNone/>
-            </a:pPr>
-            <a:endParaRPr lang="en-US" sz="1600" dirty="0"/>
+            <a:r>
+              <a:rPr lang="en-US" sz="2300" dirty="0"/>
+              <a:t>In a hot stone massage, sometimes cold stones are often used. Hard rocks should be used to relax all blood flow and relieve the skin after hot stones.</a:t>
+            </a:r>
+          </a:p>
+          <a:p>
+            <a:endParaRPr lang="en-US" sz="2150" dirty="0"/>
           </a:p>
         </p:txBody>
       </p:sp>
@@ -6934,8 +7049,8 @@
         </p:nvSpPr>
         <p:spPr>
           <a:xfrm>
-            <a:off x="289560" y="-152400"/>
-            <a:ext cx="8534400" cy="1143000"/>
+            <a:off x="304800" y="685800"/>
+            <a:ext cx="8534400" cy="914400"/>
           </a:xfrm>
         </p:spPr>
         <p:txBody>
@@ -6945,14 +7060,29 @@
           <a:lstStyle/>
           <a:p>
             <a:r>
-              <a:rPr lang="en-US" sz="3200" b="1" dirty="0">
+              <a:rPr lang="en-US" sz="3000" b="1" dirty="0">
                 <a:solidFill>
                   <a:schemeClr val="accent1"/>
                 </a:solidFill>
               </a:rPr>
-              <a:t>Benefits of Couples Hot Stone Massage</a:t>
-            </a:r>
-            <a:endParaRPr lang="en-US" sz="3200" b="1" dirty="0">
+              <a:t>Different kinds of couples hot stone massage</a:t>
+            </a:r>
+            <a:r>
+              <a:rPr lang="en-US" sz="3000" dirty="0">
+                <a:solidFill>
+                  <a:schemeClr val="accent1"/>
+                </a:solidFill>
+              </a:rPr>
+              <a:t/>
+            </a:r>
+            <a:br>
+              <a:rPr lang="en-US" sz="3000" dirty="0">
+                <a:solidFill>
+                  <a:schemeClr val="accent1"/>
+                </a:solidFill>
+              </a:rPr>
+            </a:br>
+            <a:endParaRPr lang="en-US" sz="3000" b="1" dirty="0">
               <a:solidFill>
                 <a:schemeClr val="accent1"/>
               </a:solidFill>
@@ -6962,7 +7092,7 @@
       </p:sp>
       <p:sp>
         <p:nvSpPr>
-          <p:cNvPr id="3" name="Content Placeholder 2"/>
+          <p:cNvPr id="5" name="Content Placeholder 4"/>
           <p:cNvSpPr>
             <a:spLocks noGrp="1"/>
           </p:cNvSpPr>
@@ -6972,71 +7102,83 @@
         </p:nvSpPr>
         <p:spPr>
           <a:xfrm>
-            <a:off x="228600" y="1524000"/>
-            <a:ext cx="8656320" cy="4876800"/>
+            <a:off x="152400" y="1447800"/>
+            <a:ext cx="8839200" cy="5257800"/>
           </a:xfrm>
         </p:spPr>
         <p:txBody>
           <a:bodyPr>
-            <a:noAutofit/>
+            <a:normAutofit/>
           </a:bodyPr>
           <a:lstStyle/>
           <a:p>
-            <a:r>
-              <a:rPr lang="en-US" dirty="0"/>
-              <a:t> </a:t>
-            </a:r>
-            <a:r>
-              <a:rPr lang="en-US" b="1" dirty="0" smtClean="0"/>
-              <a:t>Reduces </a:t>
-            </a:r>
-            <a:r>
-              <a:rPr lang="en-US" b="1" dirty="0"/>
-              <a:t>Stress and Anxiety</a:t>
-            </a:r>
-            <a:endParaRPr lang="en-US" dirty="0"/>
-          </a:p>
-          <a:p>
-            <a:pPr marL="0" indent="0">
+            <a:pPr marL="0" lvl="0" indent="0">
               <a:buNone/>
             </a:pPr>
             <a:r>
-              <a:rPr lang="en-US" dirty="0"/>
-              <a:t>Do you feel intellectually weary and emotionally tense? It not only relaxes your body with hot stone therapy, but it may also ease your mind. A hot stone treatment session can help reduce those levels of tension and ease any anxiety. Get into the soothing environment of a thermal massage and leave the spa as a completely new person.</a:t>
-            </a:r>
-          </a:p>
-          <a:p>
-            <a:r>
-              <a:rPr lang="en-US" dirty="0"/>
-              <a:t> </a:t>
-            </a:r>
-            <a:r>
-              <a:rPr lang="en-US" b="1" dirty="0" smtClean="0"/>
-              <a:t>Encouraged </a:t>
-            </a:r>
-            <a:r>
-              <a:rPr lang="en-US" b="1" dirty="0"/>
-              <a:t>intimacy</a:t>
-            </a:r>
-            <a:endParaRPr lang="en-US" dirty="0"/>
-          </a:p>
-          <a:p>
-            <a:pPr marL="0" indent="0">
+              <a:rPr lang="en-US" sz="2200" dirty="0"/>
+              <a:t>The Last one is a marketed massage type of hot stone that is likely to be encountered in UK spas. </a:t>
+            </a:r>
+          </a:p>
+          <a:p>
+            <a:pPr marL="0" lvl="0" indent="0">
               <a:buNone/>
             </a:pPr>
             <a:r>
-              <a:rPr lang="en-US" dirty="0"/>
-              <a:t>A specific event following a couple's massage in the urge for closeness for many couples.</a:t>
-            </a:r>
-          </a:p>
-          <a:p>
-            <a:pPr marL="0" indent="0">
+              <a:rPr lang="en-US" sz="2200" b="1" dirty="0">
+                <a:hlinkClick r:id="rId2"/>
+              </a:rPr>
+              <a:t>Hot stones </a:t>
+            </a:r>
+            <a:r>
+              <a:rPr lang="en-US" sz="2200" dirty="0"/>
+              <a:t>can also be identified as "advanced" versions of standard spa treatments, including conventional treatments like Loma.</a:t>
+            </a:r>
+          </a:p>
+          <a:p>
+            <a:pPr marL="0" lvl="0" indent="0">
               <a:buNone/>
             </a:pPr>
-            <a:endParaRPr lang="en-US" sz="1700" dirty="0"/>
-          </a:p>
-        </p:txBody>
-      </p:sp>
+            <a:r>
+              <a:rPr lang="en-US" sz="2200" dirty="0"/>
+              <a:t>The hot stone massage is often known as the river rock massage, lava stone massage, or wet stone massage. The massage was created by Lava Shells in 2009 with the same results as self-heat by using recycled Tiger Clamshells.</a:t>
+            </a:r>
+          </a:p>
+          <a:p>
+            <a:endParaRPr lang="en-US" dirty="0"/>
+          </a:p>
+        </p:txBody>
+      </p:sp>
+      <p:pic>
+        <p:nvPicPr>
+          <p:cNvPr id="3" name="Picture 2"/>
+          <p:cNvPicPr>
+            <a:picLocks noChangeAspect="1"/>
+          </p:cNvPicPr>
+          <p:nvPr/>
+        </p:nvPicPr>
+        <p:blipFill>
+          <a:blip r:embed="rId3">
+            <a:extLst>
+              <a:ext uri="{28A0092B-C50C-407E-A947-70E740481C1C}">
+                <a14:useLocalDpi xmlns:a14="http://schemas.microsoft.com/office/drawing/2010/main" val="0"/>
+              </a:ext>
+            </a:extLst>
+          </a:blip>
+          <a:stretch>
+            <a:fillRect/>
+          </a:stretch>
+        </p:blipFill>
+        <p:spPr>
+          <a:xfrm>
+            <a:off x="152400" y="4343400"/>
+            <a:ext cx="8839200" cy="2362200"/>
+          </a:xfrm>
+          <a:prstGeom prst="rect">
+            <a:avLst/>
+          </a:prstGeom>
+        </p:spPr>
+      </p:pic>
     </p:spTree>
     <p:extLst>
       <p:ext uri="{BB962C8B-B14F-4D97-AF65-F5344CB8AC3E}">
@@ -7079,7 +7221,7 @@
         </p:nvSpPr>
         <p:spPr>
           <a:xfrm>
-            <a:off x="228600" y="381000"/>
+            <a:off x="235527" y="304800"/>
             <a:ext cx="8534400" cy="609600"/>
           </a:xfrm>
         </p:spPr>
@@ -7090,14 +7232,18 @@
           <a:lstStyle/>
           <a:p>
             <a:r>
-              <a:rPr lang="en-US" sz="3200" b="1" dirty="0">
+              <a:rPr lang="en-US" b="1" dirty="0">
                 <a:solidFill>
                   <a:schemeClr val="accent1"/>
                 </a:solidFill>
               </a:rPr>
-              <a:t>Benefits of Couples Hot Stone Massage</a:t>
-            </a:r>
-            <a:endParaRPr lang="en-US" sz="3200" dirty="0"/>
+              <a:t>Benefits of couples hot stone massage</a:t>
+            </a:r>
+            <a:endParaRPr lang="en-US" sz="3600" dirty="0">
+              <a:solidFill>
+                <a:schemeClr val="accent1"/>
+              </a:solidFill>
+            </a:endParaRPr>
           </a:p>
         </p:txBody>
       </p:sp>
@@ -7113,7 +7259,7 @@
         </p:nvSpPr>
         <p:spPr>
           <a:xfrm>
-            <a:off x="228600" y="1524000"/>
+            <a:off x="228600" y="1447800"/>
             <a:ext cx="8656320" cy="5105400"/>
           </a:xfrm>
         </p:spPr>
@@ -7123,41 +7269,19 @@
           </a:bodyPr>
           <a:lstStyle/>
           <a:p>
-            <a:r>
-              <a:rPr lang="en-US" b="1" dirty="0" smtClean="0"/>
-              <a:t> Improves </a:t>
-            </a:r>
-            <a:r>
-              <a:rPr lang="en-US" b="1" dirty="0"/>
-              <a:t>Circulation</a:t>
-            </a:r>
-            <a:endParaRPr lang="en-US" dirty="0"/>
-          </a:p>
-          <a:p>
             <a:pPr marL="0" indent="0">
               <a:buNone/>
             </a:pPr>
             <a:r>
-              <a:rPr lang="en-US" sz="2450" dirty="0"/>
-              <a:t>Massages alone enhance your body's circulation; hot stones take you one step farther and boost your blood circulation more. Good circulation in your body implies that your organs receive oxygen and blood correctly. This allows them to remain functional and efficiently working.</a:t>
-            </a:r>
-          </a:p>
-          <a:p>
-            <a:r>
-              <a:rPr lang="en-US" dirty="0" smtClean="0"/>
-              <a:t> </a:t>
-            </a:r>
-            <a:r>
-              <a:rPr lang="en-US" dirty="0"/>
-              <a:t> </a:t>
-            </a:r>
-            <a:r>
-              <a:rPr lang="en-US" b="1" dirty="0" smtClean="0"/>
-              <a:t>Aids </a:t>
-            </a:r>
+              <a:rPr lang="en-US" sz="2300" dirty="0"/>
+              <a:t>In addition to profound relief, a pair of hot stone massages provide several advantages. Including:</a:t>
+            </a:r>
+          </a:p>
+          <a:p>
+            <a:pPr lvl="0"/>
             <a:r>
               <a:rPr lang="en-US" b="1" dirty="0"/>
-              <a:t>Sleep</a:t>
+              <a:t>Pain relief</a:t>
             </a:r>
             <a:endParaRPr lang="en-US" dirty="0"/>
           </a:p>
@@ -7166,25 +7290,45 @@
               <a:buNone/>
             </a:pPr>
             <a:r>
-              <a:rPr lang="en-US" sz="2250" dirty="0"/>
-              <a:t>If you're searching for higher quality sleep, then you could be wanting a </a:t>
-            </a:r>
-            <a:r>
-              <a:rPr lang="en-US" sz="2250" b="1" dirty="0">
-                <a:hlinkClick r:id="rId2"/>
-              </a:rPr>
-              <a:t>Couples Hot Stone Massage</a:t>
-            </a:r>
-            <a:r>
-              <a:rPr lang="en-US" sz="2250" dirty="0"/>
-              <a:t>. A couples hot stone massage may be relaxed in-depth and can lead to improved sleep throughout the day. Whether it helps you to sleep quicker or sleep deeper, massages have been proved to help you attain a restful night.</a:t>
+              <a:rPr lang="en-US" sz="2300" dirty="0" smtClean="0"/>
+              <a:t>In people with several diseases, such as fibromyalgia and other autoimmune disorders, warm stone massage was particularly associated with relaxation symptoms.</a:t>
             </a:r>
           </a:p>
           <a:p>
             <a:pPr marL="0" indent="0">
               <a:buNone/>
             </a:pPr>
-            <a:endParaRPr lang="en-US" sz="2400" dirty="0"/>
+            <a:r>
+              <a:rPr lang="en-US" sz="2300" dirty="0" smtClean="0"/>
+              <a:t>Many studies have associated mild massage technologies with pain reduction and increased freedom of movement, including fibromyalgia and rheumatoid arthritis.</a:t>
+            </a:r>
+          </a:p>
+          <a:p>
+            <a:pPr lvl="0"/>
+            <a:r>
+              <a:rPr lang="en-US" b="1" dirty="0" smtClean="0"/>
+              <a:t>Stress relief</a:t>
+            </a:r>
+            <a:endParaRPr lang="en-US" dirty="0" smtClean="0"/>
+          </a:p>
+          <a:p>
+            <a:pPr marL="0" indent="0">
+              <a:buNone/>
+            </a:pPr>
+            <a:r>
+              <a:rPr lang="en-US" sz="2300" dirty="0" smtClean="0"/>
+              <a:t>Massage </a:t>
+            </a:r>
+            <a:r>
+              <a:rPr lang="en-US" sz="2300" dirty="0"/>
+              <a:t>is an efficient way of relieving tension. Massage has been shown in many trials to alleviate stress and anxiety and improve cardiovascular wellbeing.</a:t>
+            </a:r>
+          </a:p>
+          <a:p>
+            <a:pPr marL="0" indent="0">
+              <a:buNone/>
+            </a:pPr>
+            <a:endParaRPr lang="en-US" sz="2300" dirty="0"/>
           </a:p>
         </p:txBody>
       </p:sp>
@@ -7228,22 +7372,31 @@
             <p:ph type="title"/>
           </p:nvPr>
         </p:nvSpPr>
-        <p:spPr/>
+        <p:spPr>
+          <a:xfrm>
+            <a:off x="360218" y="228600"/>
+            <a:ext cx="8534400" cy="758952"/>
+          </a:xfrm>
+        </p:spPr>
         <p:txBody>
           <a:bodyPr>
-            <a:normAutofit fontScale="90000"/>
+            <a:normAutofit/>
           </a:bodyPr>
           <a:lstStyle/>
           <a:p>
             <a:r>
-              <a:rPr lang="en-US" sz="3600" b="1" dirty="0">
+              <a:rPr lang="en-US" b="1" dirty="0">
                 <a:solidFill>
                   <a:schemeClr val="accent1"/>
                 </a:solidFill>
               </a:rPr>
-              <a:t>Benefits of Couples Hot Stone Massage</a:t>
-            </a:r>
-            <a:endParaRPr lang="en-US" dirty="0"/>
+              <a:t>Benefits of couples hot stone massage</a:t>
+            </a:r>
+            <a:endParaRPr lang="en-US" sz="3600" dirty="0">
+              <a:solidFill>
+                <a:schemeClr val="accent1"/>
+              </a:solidFill>
+            </a:endParaRPr>
           </a:p>
         </p:txBody>
       </p:sp>
@@ -7259,33 +7412,20 @@
         </p:nvSpPr>
         <p:spPr>
           <a:xfrm>
-            <a:off x="149352" y="3733800"/>
-            <a:ext cx="8839200" cy="2667000"/>
+            <a:off x="267115" y="1371600"/>
+            <a:ext cx="8627503" cy="4953000"/>
           </a:xfrm>
         </p:spPr>
         <p:txBody>
           <a:bodyPr>
-            <a:normAutofit fontScale="70000" lnSpcReduction="20000"/>
+            <a:normAutofit/>
           </a:bodyPr>
           <a:lstStyle/>
           <a:p>
-            <a:endParaRPr lang="en-US" dirty="0" smtClean="0"/>
-          </a:p>
-          <a:p>
-            <a:endParaRPr lang="en-US" dirty="0"/>
-          </a:p>
-          <a:p>
-            <a:r>
-              <a:rPr lang="en-US" dirty="0"/>
-              <a:t> </a:t>
-            </a:r>
-            <a:r>
-              <a:rPr lang="en-US" b="1" dirty="0" smtClean="0"/>
-              <a:t>Affection</a:t>
-            </a:r>
+            <a:pPr lvl="0"/>
             <a:r>
               <a:rPr lang="en-US" b="1" dirty="0"/>
-              <a:t> </a:t>
+              <a:t>Increased joint flexibility</a:t>
             </a:r>
             <a:endParaRPr lang="en-US" dirty="0"/>
           </a:p>
@@ -7294,12 +7434,34 @@
               <a:buNone/>
             </a:pPr>
             <a:r>
-              <a:rPr lang="en-US" dirty="0"/>
-              <a:t>A massage produces various hormones that help reduce stress, promote social connections and alleviate fatigue. If you release these hormones, your happiness and your partner will improve as well</a:t>
-            </a:r>
-            <a:r>
-              <a:rPr lang="en-US" dirty="0" smtClean="0"/>
-              <a:t>.</a:t>
+              <a:rPr lang="en-US" sz="2300" dirty="0"/>
+              <a:t>Muscle strain can make moving the joints more complicated and more painful. Massage tends to loosen muscles, meaning people walk more efficiently and comfortably.</a:t>
+            </a:r>
+          </a:p>
+          <a:p>
+            <a:pPr marL="0" indent="0">
+              <a:buNone/>
+            </a:pPr>
+            <a:r>
+              <a:rPr lang="en-US" sz="2300" dirty="0"/>
+              <a:t>People with some joint issues can particularly benefit from the massage of hot stones.</a:t>
+            </a:r>
+          </a:p>
+          <a:p>
+            <a:pPr lvl="0"/>
+            <a:r>
+              <a:rPr lang="en-US" b="1" dirty="0"/>
+              <a:t>Develop Deeper Connections with Your Partner</a:t>
+            </a:r>
+            <a:endParaRPr lang="en-US" dirty="0"/>
+          </a:p>
+          <a:p>
+            <a:pPr marL="0" indent="0">
+              <a:buNone/>
+            </a:pPr>
+            <a:r>
+              <a:rPr lang="en-US" sz="2300" dirty="0"/>
+              <a:t>A couple's hot stone massage will give you a wonderful place to relax and link together if you're looking for a way to communicate with your boyfriend or wife. You will spend the remainder of the day together and be stress-free.</a:t>
             </a:r>
           </a:p>
           <a:p>
@@ -7308,61 +7470,8 @@
             </a:pPr>
             <a:endParaRPr lang="en-US" dirty="0"/>
           </a:p>
-          <a:p>
-            <a:r>
-              <a:rPr lang="en-US" dirty="0" smtClean="0"/>
-              <a:t> </a:t>
-            </a:r>
-            <a:r>
-              <a:rPr lang="en-US" b="1" dirty="0" smtClean="0"/>
-              <a:t>Re-connect</a:t>
-            </a:r>
-            <a:endParaRPr lang="en-US" dirty="0"/>
-          </a:p>
-          <a:p>
-            <a:pPr marL="0" indent="0">
-              <a:buNone/>
-            </a:pPr>
-            <a:r>
-              <a:rPr lang="en-US" dirty="0"/>
-              <a:t>We can connect in our connection when our bodies are calm and relaxing.</a:t>
-            </a:r>
-          </a:p>
-          <a:p>
-            <a:endParaRPr lang="en-US" dirty="0"/>
-          </a:p>
-        </p:txBody>
-      </p:sp>
-      <p:pic>
-        <p:nvPicPr>
-          <p:cNvPr id="6" name="Picture 5"/>
-          <p:cNvPicPr>
-            <a:picLocks noChangeAspect="1"/>
-          </p:cNvPicPr>
-          <p:nvPr/>
-        </p:nvPicPr>
-        <p:blipFill>
-          <a:blip r:embed="rId2">
-            <a:extLst>
-              <a:ext uri="{28A0092B-C50C-407E-A947-70E740481C1C}">
-                <a14:useLocalDpi xmlns:a14="http://schemas.microsoft.com/office/drawing/2010/main" val="0"/>
-              </a:ext>
-            </a:extLst>
-          </a:blip>
-          <a:stretch>
-            <a:fillRect/>
-          </a:stretch>
-        </p:blipFill>
-        <p:spPr>
-          <a:xfrm>
-            <a:off x="149351" y="1300803"/>
-            <a:ext cx="8839201" cy="2667000"/>
-          </a:xfrm>
-          <a:prstGeom prst="rect">
-            <a:avLst/>
-          </a:prstGeom>
-        </p:spPr>
-      </p:pic>
+        </p:txBody>
+      </p:sp>
     </p:spTree>
     <p:extLst>
       <p:ext uri="{BB962C8B-B14F-4D97-AF65-F5344CB8AC3E}">
@@ -7403,31 +7512,20 @@
             <p:ph type="title"/>
           </p:nvPr>
         </p:nvSpPr>
-        <p:spPr>
-          <a:xfrm>
-            <a:off x="305908" y="152400"/>
-            <a:ext cx="8534400" cy="1063752"/>
-          </a:xfrm>
-        </p:spPr>
-        <p:txBody>
-          <a:bodyPr>
-            <a:noAutofit/>
-          </a:bodyPr>
-          <a:lstStyle/>
-          <a:p>
-            <a:r>
-              <a:rPr lang="en-US" sz="3200" b="1" dirty="0">
+        <p:spPr/>
+        <p:txBody>
+          <a:bodyPr/>
+          <a:lstStyle/>
+          <a:p>
+            <a:r>
+              <a:rPr lang="en-US" b="1" dirty="0">
                 <a:solidFill>
                   <a:schemeClr val="accent1"/>
                 </a:solidFill>
               </a:rPr>
-              <a:t>Experience the Relaxation of Hot Stone Therapy for Yourself</a:t>
-            </a:r>
-            <a:endParaRPr lang="en-US" sz="3200" dirty="0">
-              <a:solidFill>
-                <a:schemeClr val="accent1"/>
-              </a:solidFill>
-            </a:endParaRPr>
+              <a:t>Benefits of couples hot stone massage</a:t>
+            </a:r>
+            <a:endParaRPr lang="en-US" dirty="0"/>
           </a:p>
         </p:txBody>
       </p:sp>
@@ -7444,16 +7542,28 @@
         <p:spPr/>
         <p:txBody>
           <a:bodyPr>
-            <a:normAutofit fontScale="92500"/>
+            <a:normAutofit fontScale="92500" lnSpcReduction="10000"/>
           </a:bodyPr>
           <a:lstStyle/>
+          <a:p>
+            <a:pPr lvl="0"/>
+            <a:r>
+              <a:rPr lang="en-US" b="1" dirty="0"/>
+              <a:t>Relax the pains after a long day together</a:t>
+            </a:r>
+            <a:endParaRPr lang="en-US" dirty="0"/>
+          </a:p>
           <a:p>
             <a:pPr marL="0" indent="0">
               <a:buNone/>
             </a:pPr>
             <a:r>
               <a:rPr lang="en-US" dirty="0"/>
-              <a:t>There is no transient trend for the popularity of Couples Hot Stone Massages - this is to stay, and it is owing to the incredible advantages. Now is no time to reward yourself and enjoy a pleasant and peaceful hour.</a:t>
+              <a:t>What do you like after a weekend of repairs, jobs in the yard, or trips with children and families? A massage with relaxation! Reserve yours in advance so that you can relax from a well-functioning career</a:t>
+            </a:r>
+            <a:r>
+              <a:rPr lang="en-US" dirty="0" smtClean="0"/>
+              <a:t>.</a:t>
             </a:r>
           </a:p>
           <a:p>
@@ -7463,27 +7573,28 @@
             <a:endParaRPr lang="en-US" dirty="0"/>
           </a:p>
           <a:p>
+            <a:pPr lvl="0"/>
+            <a:r>
+              <a:rPr lang="en-US" b="1" dirty="0"/>
+              <a:t>Use Your Health Benefits</a:t>
+            </a:r>
+            <a:endParaRPr lang="en-US" dirty="0"/>
+          </a:p>
+          <a:p>
             <a:pPr marL="0" indent="0">
               <a:buNone/>
             </a:pPr>
             <a:r>
-              <a:rPr lang="en-US" sz="2750" dirty="0" smtClean="0"/>
-              <a:t>Couldn't </a:t>
-            </a:r>
-            <a:r>
-              <a:rPr lang="en-US" sz="2750" dirty="0"/>
-              <a:t>you locate a location to massage hot stone? Or perhaps you would like to take advantage of the convenience of your home. Our massages may provide the same calming and soothing effects as a Couples Hot Stone Massage with the heated Shoulder Massager.</a:t>
-            </a:r>
-          </a:p>
-          <a:p>
-            <a:endParaRPr lang="en-US" dirty="0"/>
+              <a:rPr lang="en-US" dirty="0"/>
+              <a:t>What is better than a massage of greatness? A massage is payable! A perfect massage! For your pair massage, use your fitness benefits. Therapeutic Body Concepts provides full accounting for the therapies and programs the benefit plan has accepted.</a:t>
+            </a:r>
           </a:p>
         </p:txBody>
       </p:sp>
     </p:spTree>
     <p:extLst>
       <p:ext uri="{BB962C8B-B14F-4D97-AF65-F5344CB8AC3E}">
-        <p14:creationId xmlns:p14="http://schemas.microsoft.com/office/powerpoint/2010/main" val="3960493632"/>
+        <p14:creationId xmlns:p14="http://schemas.microsoft.com/office/powerpoint/2010/main" val="1478588307"/>
       </p:ext>
     </p:extLst>
   </p:cSld>

</xml_diff>